<commit_message>
add houston pollen analysis
</commit_message>
<xml_diff>
--- a/houston_pollen/houston_pollen_slides.pptx
+++ b/houston_pollen/houston_pollen_slides.pptx
@@ -9555,7 +9555,7 @@
         <p:spPr>
           <a:xfrm>
             <a:off x="672700" y="1471890"/>
-            <a:ext cx="5067373" cy="2383337"/>
+            <a:ext cx="5067373" cy="2563269"/>
           </a:xfrm>
           <a:prstGeom prst="rect">
             <a:avLst/>
@@ -9600,6 +9600,18 @@
                 <a:latin typeface="Abadi" panose="020B0604020104020204" pitchFamily="34" charset="0"/>
               </a:rPr>
               <a:t>Pollen count in the daily report includes tree pollen, grass pollen, and weed pollen</a:t>
+            </a:r>
+          </a:p>
+          <a:p>
+            <a:pPr marL="171450" indent="-171450"/>
+            <a:r>
+              <a:rPr lang="en-US" sz="1400" b="1" dirty="0">
+                <a:solidFill>
+                  <a:srgbClr val="FF0000"/>
+                </a:solidFill>
+                <a:latin typeface="Abadi" panose="020B0604020104020204" pitchFamily="34" charset="0"/>
+              </a:rPr>
+              <a:t>Question: which month has high pollen count, and what contributes to the pollen count?</a:t>
             </a:r>
           </a:p>
           <a:p>

</xml_diff>